<commit_message>
hackathon notebook added and docs updated
</commit_message>
<xml_diff>
--- a/intel_ocr/docs/intel_review_5thNov_V2.0.pptx
+++ b/intel_ocr/docs/intel_review_5thNov_V2.0.pptx
@@ -6,7 +6,7 @@
     <p:sldMasterId id="2147483748" r:id="rId4"/>
   </p:sldMasterIdLst>
   <p:notesMasterIdLst>
-    <p:notesMasterId r:id="rId23"/>
+    <p:notesMasterId r:id="rId24"/>
   </p:notesMasterIdLst>
   <p:sldIdLst>
     <p:sldId id="256" r:id="rId5"/>
@@ -26,12 +26,13 @@
     <p:sldId id="276" r:id="rId19"/>
     <p:sldId id="277" r:id="rId20"/>
     <p:sldId id="268" r:id="rId21"/>
-    <p:sldId id="267" r:id="rId22"/>
+    <p:sldId id="279" r:id="rId22"/>
+    <p:sldId id="267" r:id="rId23"/>
   </p:sldIdLst>
   <p:sldSz cx="10969625" cy="6170613"/>
   <p:notesSz cx="6858000" cy="9144000"/>
   <p:custDataLst>
-    <p:tags r:id="rId24"/>
+    <p:tags r:id="rId25"/>
   </p:custDataLst>
   <p:defaultTextStyle>
     <a:defPPr>
@@ -248,7 +249,7 @@
           <a:p>
             <a:fld id="{6007911F-CEAF-4F0B-98BD-EFB38C6572AA}" type="datetimeFigureOut">
               <a:rPr lang="de-DE" smtClean="0"/>
-              <a:t>05.11.2019</a:t>
+              <a:t>21.11.2019</a:t>
             </a:fld>
             <a:endParaRPr lang="de-DE"/>
           </a:p>
@@ -10671,15 +10672,7 @@
             </a:pPr>
             <a:r>
               <a:rPr lang="en-US" b="1" dirty="0" smtClean="0"/>
-              <a:t>Classification &gt; </a:t>
-            </a:r>
-            <a:r>
-              <a:rPr lang="en-US" b="1" dirty="0" smtClean="0"/>
-              <a:t>97% </a:t>
-            </a:r>
-            <a:r>
-              <a:rPr lang="en-US" b="1" dirty="0" smtClean="0"/>
-              <a:t>accuracy</a:t>
+              <a:t>Classification &gt; 97% accuracy</a:t>
             </a:r>
           </a:p>
           <a:p>
@@ -13925,6 +13918,1005 @@
       </p:grpSpPr>
       <p:sp>
         <p:nvSpPr>
+          <p:cNvPr id="2" name="Text Placeholder 1"/>
+          <p:cNvSpPr>
+            <a:spLocks noGrp="1"/>
+          </p:cNvSpPr>
+          <p:nvPr>
+            <p:ph type="body" sz="quarter" idx="15"/>
+          </p:nvPr>
+        </p:nvSpPr>
+        <p:spPr/>
+        <p:txBody>
+          <a:bodyPr/>
+          <a:lstStyle/>
+          <a:p>
+            <a:r>
+              <a:rPr lang="en-US" smtClean="0"/>
+              <a:t>GUI</a:t>
+            </a:r>
+            <a:endParaRPr lang="en-US"/>
+          </a:p>
+        </p:txBody>
+      </p:sp>
+      <p:sp>
+        <p:nvSpPr>
+          <p:cNvPr id="6" name="Slide Number Placeholder 5"/>
+          <p:cNvSpPr>
+            <a:spLocks noGrp="1"/>
+          </p:cNvSpPr>
+          <p:nvPr>
+            <p:ph type="sldNum" sz="quarter" idx="12"/>
+          </p:nvPr>
+        </p:nvSpPr>
+        <p:spPr/>
+        <p:txBody>
+          <a:bodyPr/>
+          <a:lstStyle/>
+          <a:p>
+            <a:fld id="{4898AEC0-503E-4FA4-859C-D0F72D6E3F79}" type="slidenum">
+              <a:rPr lang="de-DE" smtClean="0"/>
+              <a:pPr/>
+              <a:t>18</a:t>
+            </a:fld>
+            <a:endParaRPr lang="de-DE"/>
+          </a:p>
+        </p:txBody>
+      </p:sp>
+      <p:sp>
+        <p:nvSpPr>
+          <p:cNvPr id="7" name="Rectangle 6"/>
+          <p:cNvSpPr/>
+          <p:nvPr/>
+        </p:nvSpPr>
+        <p:spPr>
+          <a:xfrm>
+            <a:off x="266700" y="772510"/>
+            <a:ext cx="10443300" cy="4658711"/>
+          </a:xfrm>
+          <a:prstGeom prst="rect">
+            <a:avLst/>
+          </a:prstGeom>
+          <a:noFill/>
+          <a:ln w="9525" cap="flat" cmpd="sng" algn="ctr">
+            <a:solidFill>
+              <a:srgbClr val="3F136C"/>
+            </a:solidFill>
+            <a:prstDash val="solid"/>
+          </a:ln>
+          <a:effectLst/>
+        </p:spPr>
+        <p:txBody>
+          <a:bodyPr rtlCol="0" anchor="ctr"/>
+          <a:lstStyle/>
+          <a:p>
+            <a:pPr marL="0" marR="0" indent="0" algn="ctr" defTabSz="914400" eaLnBrk="1" fontAlgn="auto" latinLnBrk="0" hangingPunct="1">
+              <a:lnSpc>
+                <a:spcPct val="100000"/>
+              </a:lnSpc>
+              <a:spcBef>
+                <a:spcPts val="0"/>
+              </a:spcBef>
+              <a:spcAft>
+                <a:spcPts val="0"/>
+              </a:spcAft>
+              <a:buClrTx/>
+              <a:buSzTx/>
+              <a:buFontTx/>
+              <a:buNone/>
+              <a:tabLst/>
+            </a:pPr>
+            <a:endParaRPr kumimoji="0" lang="en-US" sz="1800" b="0" i="0" u="none" strike="noStrike" kern="0" cap="none" spc="0" normalizeH="0" baseline="0" noProof="0" dirty="0" smtClean="0">
+              <a:ln>
+                <a:noFill/>
+              </a:ln>
+              <a:solidFill>
+                <a:srgbClr val="000000"/>
+              </a:solidFill>
+              <a:effectLst/>
+              <a:uLnTx/>
+              <a:uFillTx/>
+              <a:latin typeface="Bosch Office Sans"/>
+              <a:ea typeface="+mn-ea"/>
+              <a:cs typeface="+mn-cs"/>
+            </a:endParaRPr>
+          </a:p>
+        </p:txBody>
+      </p:sp>
+      <p:sp>
+        <p:nvSpPr>
+          <p:cNvPr id="8" name="Rectangle 7"/>
+          <p:cNvSpPr/>
+          <p:nvPr/>
+        </p:nvSpPr>
+        <p:spPr>
+          <a:xfrm>
+            <a:off x="410845" y="1008993"/>
+            <a:ext cx="2166817" cy="441435"/>
+          </a:xfrm>
+          <a:prstGeom prst="rect">
+            <a:avLst/>
+          </a:prstGeom>
+          <a:noFill/>
+          <a:ln w="9525" cap="flat" cmpd="sng" algn="ctr">
+            <a:solidFill>
+              <a:srgbClr val="3F136C"/>
+            </a:solidFill>
+            <a:prstDash val="solid"/>
+          </a:ln>
+          <a:effectLst/>
+        </p:spPr>
+        <p:txBody>
+          <a:bodyPr rtlCol="0" anchor="ctr"/>
+          <a:lstStyle/>
+          <a:p>
+            <a:pPr marL="0" marR="0" indent="0" algn="ctr" defTabSz="914400" eaLnBrk="1" fontAlgn="auto" latinLnBrk="0" hangingPunct="1">
+              <a:lnSpc>
+                <a:spcPct val="100000"/>
+              </a:lnSpc>
+              <a:spcBef>
+                <a:spcPts val="0"/>
+              </a:spcBef>
+              <a:spcAft>
+                <a:spcPts val="0"/>
+              </a:spcAft>
+              <a:buClrTx/>
+              <a:buSzTx/>
+              <a:buFontTx/>
+              <a:buNone/>
+              <a:tabLst/>
+            </a:pPr>
+            <a:r>
+              <a:rPr kumimoji="0" lang="en-US" sz="1800" b="0" i="0" u="none" strike="noStrike" kern="0" cap="none" spc="0" normalizeH="0" baseline="0" noProof="0" dirty="0" smtClean="0">
+                <a:ln>
+                  <a:noFill/>
+                </a:ln>
+                <a:solidFill>
+                  <a:srgbClr val="000000"/>
+                </a:solidFill>
+                <a:effectLst/>
+                <a:uLnTx/>
+                <a:uFillTx/>
+                <a:latin typeface="Bosch Office Sans"/>
+                <a:ea typeface="+mn-ea"/>
+                <a:cs typeface="+mn-cs"/>
+              </a:rPr>
+              <a:t>Equation</a:t>
+            </a:r>
+            <a:r>
+              <a:rPr kumimoji="0" lang="en-US" sz="1800" b="0" i="0" u="none" strike="noStrike" kern="0" cap="none" spc="0" normalizeH="0" noProof="0" dirty="0" smtClean="0">
+                <a:ln>
+                  <a:noFill/>
+                </a:ln>
+                <a:solidFill>
+                  <a:srgbClr val="000000"/>
+                </a:solidFill>
+                <a:effectLst/>
+                <a:uLnTx/>
+                <a:uFillTx/>
+                <a:latin typeface="Bosch Office Sans"/>
+                <a:ea typeface="+mn-ea"/>
+                <a:cs typeface="+mn-cs"/>
+              </a:rPr>
+              <a:t> 1&lt;Static&gt;</a:t>
+            </a:r>
+            <a:endParaRPr kumimoji="0" lang="en-US" sz="1800" b="0" i="0" u="none" strike="noStrike" kern="0" cap="none" spc="0" normalizeH="0" baseline="0" noProof="0" dirty="0" smtClean="0">
+              <a:ln>
+                <a:noFill/>
+              </a:ln>
+              <a:solidFill>
+                <a:srgbClr val="000000"/>
+              </a:solidFill>
+              <a:effectLst/>
+              <a:uLnTx/>
+              <a:uFillTx/>
+              <a:latin typeface="Bosch Office Sans"/>
+              <a:ea typeface="+mn-ea"/>
+              <a:cs typeface="+mn-cs"/>
+            </a:endParaRPr>
+          </a:p>
+        </p:txBody>
+      </p:sp>
+      <p:sp>
+        <p:nvSpPr>
+          <p:cNvPr id="9" name="Rectangle 8"/>
+          <p:cNvSpPr/>
+          <p:nvPr/>
+        </p:nvSpPr>
+        <p:spPr>
+          <a:xfrm>
+            <a:off x="410845" y="1702677"/>
+            <a:ext cx="2166817" cy="441435"/>
+          </a:xfrm>
+          <a:prstGeom prst="rect">
+            <a:avLst/>
+          </a:prstGeom>
+          <a:noFill/>
+          <a:ln w="9525" cap="flat" cmpd="sng" algn="ctr">
+            <a:solidFill>
+              <a:srgbClr val="3F136C"/>
+            </a:solidFill>
+            <a:prstDash val="solid"/>
+          </a:ln>
+          <a:effectLst/>
+        </p:spPr>
+        <p:txBody>
+          <a:bodyPr rtlCol="0" anchor="ctr"/>
+          <a:lstStyle/>
+          <a:p>
+            <a:pPr marL="0" marR="0" indent="0" algn="ctr" defTabSz="914400" eaLnBrk="1" fontAlgn="auto" latinLnBrk="0" hangingPunct="1">
+              <a:lnSpc>
+                <a:spcPct val="100000"/>
+              </a:lnSpc>
+              <a:spcBef>
+                <a:spcPts val="0"/>
+              </a:spcBef>
+              <a:spcAft>
+                <a:spcPts val="0"/>
+              </a:spcAft>
+              <a:buClrTx/>
+              <a:buSzTx/>
+              <a:buFontTx/>
+              <a:buNone/>
+              <a:tabLst/>
+            </a:pPr>
+            <a:r>
+              <a:rPr lang="en-US" kern="0" dirty="0">
+                <a:solidFill>
+                  <a:srgbClr val="000000"/>
+                </a:solidFill>
+                <a:latin typeface="Bosch Office Sans"/>
+              </a:rPr>
+              <a:t>Equation </a:t>
+            </a:r>
+            <a:r>
+              <a:rPr lang="en-US" kern="0" dirty="0" smtClean="0">
+                <a:solidFill>
+                  <a:srgbClr val="000000"/>
+                </a:solidFill>
+                <a:latin typeface="Bosch Office Sans"/>
+              </a:rPr>
+              <a:t>2&lt;Static</a:t>
+            </a:r>
+            <a:r>
+              <a:rPr lang="en-US" kern="0" dirty="0">
+                <a:solidFill>
+                  <a:srgbClr val="000000"/>
+                </a:solidFill>
+                <a:latin typeface="Bosch Office Sans"/>
+              </a:rPr>
+              <a:t>&gt;</a:t>
+            </a:r>
+          </a:p>
+        </p:txBody>
+      </p:sp>
+      <p:sp>
+        <p:nvSpPr>
+          <p:cNvPr id="10" name="Rectangle 9"/>
+          <p:cNvSpPr/>
+          <p:nvPr/>
+        </p:nvSpPr>
+        <p:spPr>
+          <a:xfrm>
+            <a:off x="410845" y="2442009"/>
+            <a:ext cx="2166817" cy="441435"/>
+          </a:xfrm>
+          <a:prstGeom prst="rect">
+            <a:avLst/>
+          </a:prstGeom>
+          <a:noFill/>
+          <a:ln w="9525" cap="flat" cmpd="sng" algn="ctr">
+            <a:solidFill>
+              <a:srgbClr val="3F136C"/>
+            </a:solidFill>
+            <a:prstDash val="solid"/>
+          </a:ln>
+          <a:effectLst/>
+        </p:spPr>
+        <p:txBody>
+          <a:bodyPr rtlCol="0" anchor="ctr"/>
+          <a:lstStyle/>
+          <a:p>
+            <a:pPr marL="0" marR="0" indent="0" algn="ctr" defTabSz="914400" eaLnBrk="1" fontAlgn="auto" latinLnBrk="0" hangingPunct="1">
+              <a:lnSpc>
+                <a:spcPct val="100000"/>
+              </a:lnSpc>
+              <a:spcBef>
+                <a:spcPts val="0"/>
+              </a:spcBef>
+              <a:spcAft>
+                <a:spcPts val="0"/>
+              </a:spcAft>
+              <a:buClrTx/>
+              <a:buSzTx/>
+              <a:buFontTx/>
+              <a:buNone/>
+              <a:tabLst/>
+            </a:pPr>
+            <a:r>
+              <a:rPr lang="en-US" kern="0" dirty="0">
+                <a:solidFill>
+                  <a:srgbClr val="000000"/>
+                </a:solidFill>
+                <a:latin typeface="Bosch Office Sans"/>
+              </a:rPr>
+              <a:t>Equation </a:t>
+            </a:r>
+            <a:r>
+              <a:rPr lang="en-US" kern="0" dirty="0" smtClean="0">
+                <a:solidFill>
+                  <a:srgbClr val="000000"/>
+                </a:solidFill>
+                <a:latin typeface="Bosch Office Sans"/>
+              </a:rPr>
+              <a:t>3&lt;Static</a:t>
+            </a:r>
+            <a:r>
+              <a:rPr lang="en-US" kern="0" dirty="0">
+                <a:solidFill>
+                  <a:srgbClr val="000000"/>
+                </a:solidFill>
+                <a:latin typeface="Bosch Office Sans"/>
+              </a:rPr>
+              <a:t>&gt;</a:t>
+            </a:r>
+          </a:p>
+        </p:txBody>
+      </p:sp>
+      <p:sp>
+        <p:nvSpPr>
+          <p:cNvPr id="11" name="Rectangle 10"/>
+          <p:cNvSpPr/>
+          <p:nvPr/>
+        </p:nvSpPr>
+        <p:spPr>
+          <a:xfrm>
+            <a:off x="2956032" y="1008993"/>
+            <a:ext cx="3318641" cy="4300220"/>
+          </a:xfrm>
+          <a:prstGeom prst="rect">
+            <a:avLst/>
+          </a:prstGeom>
+          <a:noFill/>
+          <a:ln w="9525" cap="flat" cmpd="sng" algn="ctr">
+            <a:solidFill>
+              <a:srgbClr val="3F136C"/>
+            </a:solidFill>
+            <a:prstDash val="solid"/>
+          </a:ln>
+          <a:effectLst/>
+        </p:spPr>
+        <p:txBody>
+          <a:bodyPr rtlCol="0" anchor="ctr"/>
+          <a:lstStyle/>
+          <a:p>
+            <a:pPr marL="0" marR="0" indent="0" algn="ctr" defTabSz="914400" eaLnBrk="1" fontAlgn="auto" latinLnBrk="0" hangingPunct="1">
+              <a:lnSpc>
+                <a:spcPct val="100000"/>
+              </a:lnSpc>
+              <a:spcBef>
+                <a:spcPts val="0"/>
+              </a:spcBef>
+              <a:spcAft>
+                <a:spcPts val="0"/>
+              </a:spcAft>
+              <a:buClrTx/>
+              <a:buSzTx/>
+              <a:buFontTx/>
+              <a:buNone/>
+              <a:tabLst/>
+            </a:pPr>
+            <a:endParaRPr kumimoji="0" lang="en-US" sz="1800" b="0" i="0" u="none" strike="noStrike" kern="0" cap="none" spc="0" normalizeH="0" baseline="0" noProof="0" dirty="0" smtClean="0">
+              <a:ln>
+                <a:noFill/>
+              </a:ln>
+              <a:solidFill>
+                <a:srgbClr val="000000"/>
+              </a:solidFill>
+              <a:effectLst/>
+              <a:uLnTx/>
+              <a:uFillTx/>
+              <a:latin typeface="Bosch Office Sans"/>
+              <a:ea typeface="+mn-ea"/>
+              <a:cs typeface="+mn-cs"/>
+            </a:endParaRPr>
+          </a:p>
+        </p:txBody>
+      </p:sp>
+      <p:sp>
+        <p:nvSpPr>
+          <p:cNvPr id="12" name="Rectangle 11"/>
+          <p:cNvSpPr/>
+          <p:nvPr/>
+        </p:nvSpPr>
+        <p:spPr>
+          <a:xfrm>
+            <a:off x="6395544" y="1008993"/>
+            <a:ext cx="3318641" cy="1381541"/>
+          </a:xfrm>
+          <a:prstGeom prst="rect">
+            <a:avLst/>
+          </a:prstGeom>
+          <a:noFill/>
+          <a:ln w="9525" cap="flat" cmpd="sng" algn="ctr">
+            <a:solidFill>
+              <a:srgbClr val="3F136C"/>
+            </a:solidFill>
+            <a:prstDash val="solid"/>
+          </a:ln>
+          <a:effectLst/>
+        </p:spPr>
+        <p:txBody>
+          <a:bodyPr rtlCol="0" anchor="ctr"/>
+          <a:lstStyle/>
+          <a:p>
+            <a:pPr marL="0" marR="0" indent="0" algn="ctr" defTabSz="914400" eaLnBrk="1" fontAlgn="auto" latinLnBrk="0" hangingPunct="1">
+              <a:lnSpc>
+                <a:spcPct val="100000"/>
+              </a:lnSpc>
+              <a:spcBef>
+                <a:spcPts val="0"/>
+              </a:spcBef>
+              <a:spcAft>
+                <a:spcPts val="0"/>
+              </a:spcAft>
+              <a:buClrTx/>
+              <a:buSzTx/>
+              <a:buFontTx/>
+              <a:buNone/>
+              <a:tabLst/>
+            </a:pPr>
+            <a:r>
+              <a:rPr lang="en-US" kern="0" dirty="0" smtClean="0">
+                <a:solidFill>
+                  <a:srgbClr val="000000"/>
+                </a:solidFill>
+                <a:latin typeface="Bosch Office Sans"/>
+              </a:rPr>
+              <a:t>Output 1 Image&lt;Dynamic&gt;</a:t>
+            </a:r>
+            <a:endParaRPr lang="en-US" kern="0" dirty="0">
+              <a:solidFill>
+                <a:srgbClr val="000000"/>
+              </a:solidFill>
+              <a:latin typeface="Bosch Office Sans"/>
+            </a:endParaRPr>
+          </a:p>
+        </p:txBody>
+      </p:sp>
+      <p:sp>
+        <p:nvSpPr>
+          <p:cNvPr id="13" name="Rectangle 12"/>
+          <p:cNvSpPr/>
+          <p:nvPr/>
+        </p:nvSpPr>
+        <p:spPr>
+          <a:xfrm>
+            <a:off x="6395542" y="2390534"/>
+            <a:ext cx="3318641" cy="1448369"/>
+          </a:xfrm>
+          <a:prstGeom prst="rect">
+            <a:avLst/>
+          </a:prstGeom>
+          <a:noFill/>
+          <a:ln w="9525" cap="flat" cmpd="sng" algn="ctr">
+            <a:solidFill>
+              <a:srgbClr val="3F136C"/>
+            </a:solidFill>
+            <a:prstDash val="solid"/>
+          </a:ln>
+          <a:effectLst/>
+        </p:spPr>
+        <p:txBody>
+          <a:bodyPr rtlCol="0" anchor="ctr"/>
+          <a:lstStyle/>
+          <a:p>
+            <a:pPr marL="0" marR="0" indent="0" algn="ctr" defTabSz="914400" eaLnBrk="1" fontAlgn="auto" latinLnBrk="0" hangingPunct="1">
+              <a:lnSpc>
+                <a:spcPct val="100000"/>
+              </a:lnSpc>
+              <a:spcBef>
+                <a:spcPts val="0"/>
+              </a:spcBef>
+              <a:spcAft>
+                <a:spcPts val="0"/>
+              </a:spcAft>
+              <a:buClrTx/>
+              <a:buSzTx/>
+              <a:buFontTx/>
+              <a:buNone/>
+              <a:tabLst/>
+            </a:pPr>
+            <a:r>
+              <a:rPr lang="en-US" kern="0" dirty="0">
+                <a:solidFill>
+                  <a:srgbClr val="000000"/>
+                </a:solidFill>
+                <a:latin typeface="Bosch Office Sans"/>
+              </a:rPr>
+              <a:t>Output </a:t>
+            </a:r>
+            <a:r>
+              <a:rPr lang="en-US" kern="0" dirty="0" smtClean="0">
+                <a:solidFill>
+                  <a:srgbClr val="000000"/>
+                </a:solidFill>
+                <a:latin typeface="Bosch Office Sans"/>
+              </a:rPr>
+              <a:t>2 Image&lt;Dynamic</a:t>
+            </a:r>
+            <a:r>
+              <a:rPr lang="en-US" kern="0" dirty="0">
+                <a:solidFill>
+                  <a:srgbClr val="000000"/>
+                </a:solidFill>
+                <a:latin typeface="Bosch Office Sans"/>
+              </a:rPr>
+              <a:t>&gt;</a:t>
+            </a:r>
+            <a:endParaRPr lang="en-US" kern="0" dirty="0">
+              <a:solidFill>
+                <a:srgbClr val="000000"/>
+              </a:solidFill>
+              <a:latin typeface="Bosch Office Sans"/>
+            </a:endParaRPr>
+          </a:p>
+        </p:txBody>
+      </p:sp>
+      <p:sp>
+        <p:nvSpPr>
+          <p:cNvPr id="14" name="Rectangle 13"/>
+          <p:cNvSpPr/>
+          <p:nvPr/>
+        </p:nvSpPr>
+        <p:spPr>
+          <a:xfrm>
+            <a:off x="6395543" y="3838903"/>
+            <a:ext cx="3318641" cy="1468664"/>
+          </a:xfrm>
+          <a:prstGeom prst="rect">
+            <a:avLst/>
+          </a:prstGeom>
+          <a:noFill/>
+          <a:ln w="9525" cap="flat" cmpd="sng" algn="ctr">
+            <a:solidFill>
+              <a:srgbClr val="3F136C"/>
+            </a:solidFill>
+            <a:prstDash val="solid"/>
+          </a:ln>
+          <a:effectLst/>
+        </p:spPr>
+        <p:txBody>
+          <a:bodyPr rtlCol="0" anchor="ctr"/>
+          <a:lstStyle/>
+          <a:p>
+            <a:pPr marL="0" marR="0" indent="0" algn="ctr" defTabSz="914400" eaLnBrk="1" fontAlgn="auto" latinLnBrk="0" hangingPunct="1">
+              <a:lnSpc>
+                <a:spcPct val="100000"/>
+              </a:lnSpc>
+              <a:spcBef>
+                <a:spcPts val="0"/>
+              </a:spcBef>
+              <a:spcAft>
+                <a:spcPts val="0"/>
+              </a:spcAft>
+              <a:buClrTx/>
+              <a:buSzTx/>
+              <a:buFontTx/>
+              <a:buNone/>
+              <a:tabLst/>
+            </a:pPr>
+            <a:r>
+              <a:rPr lang="en-US" kern="0" dirty="0">
+                <a:solidFill>
+                  <a:srgbClr val="000000"/>
+                </a:solidFill>
+                <a:latin typeface="Bosch Office Sans"/>
+              </a:rPr>
+              <a:t>Output </a:t>
+            </a:r>
+            <a:r>
+              <a:rPr lang="en-US" kern="0" dirty="0" smtClean="0">
+                <a:solidFill>
+                  <a:srgbClr val="000000"/>
+                </a:solidFill>
+                <a:latin typeface="Bosch Office Sans"/>
+              </a:rPr>
+              <a:t>3 Image&lt;Dynamic</a:t>
+            </a:r>
+            <a:r>
+              <a:rPr lang="en-US" kern="0" dirty="0">
+                <a:solidFill>
+                  <a:srgbClr val="000000"/>
+                </a:solidFill>
+                <a:latin typeface="Bosch Office Sans"/>
+              </a:rPr>
+              <a:t>&gt;</a:t>
+            </a:r>
+            <a:endParaRPr lang="en-US" kern="0" dirty="0">
+              <a:solidFill>
+                <a:srgbClr val="000000"/>
+              </a:solidFill>
+              <a:latin typeface="Bosch Office Sans"/>
+            </a:endParaRPr>
+          </a:p>
+        </p:txBody>
+      </p:sp>
+      <p:sp>
+        <p:nvSpPr>
+          <p:cNvPr id="15" name="Rectangle 14"/>
+          <p:cNvSpPr/>
+          <p:nvPr/>
+        </p:nvSpPr>
+        <p:spPr>
+          <a:xfrm>
+            <a:off x="9800485" y="1251631"/>
+            <a:ext cx="817592" cy="541284"/>
+          </a:xfrm>
+          <a:prstGeom prst="rect">
+            <a:avLst/>
+          </a:prstGeom>
+          <a:noFill/>
+          <a:ln w="9525" cap="flat" cmpd="sng" algn="ctr">
+            <a:solidFill>
+              <a:srgbClr val="3F136C"/>
+            </a:solidFill>
+            <a:prstDash val="solid"/>
+          </a:ln>
+          <a:effectLst/>
+        </p:spPr>
+        <p:txBody>
+          <a:bodyPr rtlCol="0" anchor="ctr"/>
+          <a:lstStyle/>
+          <a:p>
+            <a:pPr marL="0" marR="0" indent="0" algn="ctr" defTabSz="914400" eaLnBrk="1" fontAlgn="auto" latinLnBrk="0" hangingPunct="1">
+              <a:lnSpc>
+                <a:spcPct val="100000"/>
+              </a:lnSpc>
+              <a:spcBef>
+                <a:spcPts val="0"/>
+              </a:spcBef>
+              <a:spcAft>
+                <a:spcPts val="0"/>
+              </a:spcAft>
+              <a:buClrTx/>
+              <a:buSzTx/>
+              <a:buFontTx/>
+              <a:buNone/>
+              <a:tabLst/>
+            </a:pPr>
+            <a:r>
+              <a:rPr kumimoji="0" lang="en-US" sz="1000" b="0" i="0" u="none" strike="noStrike" kern="0" cap="none" spc="0" normalizeH="0" baseline="0" noProof="0" dirty="0" smtClean="0">
+                <a:ln>
+                  <a:noFill/>
+                </a:ln>
+                <a:solidFill>
+                  <a:srgbClr val="000000"/>
+                </a:solidFill>
+                <a:effectLst/>
+                <a:uLnTx/>
+                <a:uFillTx/>
+                <a:latin typeface="Bosch Office Sans"/>
+                <a:ea typeface="+mn-ea"/>
+                <a:cs typeface="+mn-cs"/>
+              </a:rPr>
+              <a:t>Text1&lt;Dynamic&gt;</a:t>
+            </a:r>
+            <a:endParaRPr kumimoji="0" lang="en-US" sz="1000" b="0" i="0" u="none" strike="noStrike" kern="0" cap="none" spc="0" normalizeH="0" baseline="0" noProof="0" dirty="0" smtClean="0">
+              <a:ln>
+                <a:noFill/>
+              </a:ln>
+              <a:solidFill>
+                <a:srgbClr val="000000"/>
+              </a:solidFill>
+              <a:effectLst/>
+              <a:uLnTx/>
+              <a:uFillTx/>
+              <a:latin typeface="Bosch Office Sans"/>
+              <a:ea typeface="+mn-ea"/>
+              <a:cs typeface="+mn-cs"/>
+            </a:endParaRPr>
+          </a:p>
+        </p:txBody>
+      </p:sp>
+      <p:sp>
+        <p:nvSpPr>
+          <p:cNvPr id="16" name="Rectangle 15"/>
+          <p:cNvSpPr/>
+          <p:nvPr/>
+        </p:nvSpPr>
+        <p:spPr>
+          <a:xfrm>
+            <a:off x="9800485" y="2860700"/>
+            <a:ext cx="817592" cy="541284"/>
+          </a:xfrm>
+          <a:prstGeom prst="rect">
+            <a:avLst/>
+          </a:prstGeom>
+          <a:noFill/>
+          <a:ln w="9525" cap="flat" cmpd="sng" algn="ctr">
+            <a:solidFill>
+              <a:srgbClr val="3F136C"/>
+            </a:solidFill>
+            <a:prstDash val="solid"/>
+          </a:ln>
+          <a:effectLst/>
+        </p:spPr>
+        <p:txBody>
+          <a:bodyPr rtlCol="0" anchor="ctr"/>
+          <a:lstStyle/>
+          <a:p>
+            <a:pPr marL="0" marR="0" indent="0" algn="ctr" defTabSz="914400" eaLnBrk="1" fontAlgn="auto" latinLnBrk="0" hangingPunct="1">
+              <a:lnSpc>
+                <a:spcPct val="100000"/>
+              </a:lnSpc>
+              <a:spcBef>
+                <a:spcPts val="0"/>
+              </a:spcBef>
+              <a:spcAft>
+                <a:spcPts val="0"/>
+              </a:spcAft>
+              <a:buClrTx/>
+              <a:buSzTx/>
+              <a:buFontTx/>
+              <a:buNone/>
+              <a:tabLst/>
+            </a:pPr>
+            <a:r>
+              <a:rPr lang="en-US" sz="1050" kern="0" dirty="0" smtClean="0">
+                <a:solidFill>
+                  <a:srgbClr val="000000"/>
+                </a:solidFill>
+                <a:latin typeface="Bosch Office Sans"/>
+              </a:rPr>
+              <a:t>Text2&lt;Dynamic</a:t>
+            </a:r>
+            <a:r>
+              <a:rPr lang="en-US" sz="1050" kern="0" dirty="0">
+                <a:solidFill>
+                  <a:srgbClr val="000000"/>
+                </a:solidFill>
+                <a:latin typeface="Bosch Office Sans"/>
+              </a:rPr>
+              <a:t>&gt;</a:t>
+            </a:r>
+          </a:p>
+        </p:txBody>
+      </p:sp>
+      <p:sp>
+        <p:nvSpPr>
+          <p:cNvPr id="17" name="Rectangle 16"/>
+          <p:cNvSpPr/>
+          <p:nvPr/>
+        </p:nvSpPr>
+        <p:spPr>
+          <a:xfrm>
+            <a:off x="9800485" y="4400465"/>
+            <a:ext cx="817592" cy="541284"/>
+          </a:xfrm>
+          <a:prstGeom prst="rect">
+            <a:avLst/>
+          </a:prstGeom>
+          <a:noFill/>
+          <a:ln w="9525" cap="flat" cmpd="sng" algn="ctr">
+            <a:solidFill>
+              <a:srgbClr val="3F136C"/>
+            </a:solidFill>
+            <a:prstDash val="solid"/>
+          </a:ln>
+          <a:effectLst/>
+        </p:spPr>
+        <p:txBody>
+          <a:bodyPr rtlCol="0" anchor="ctr"/>
+          <a:lstStyle/>
+          <a:p>
+            <a:pPr marL="0" marR="0" indent="0" algn="ctr" defTabSz="914400" eaLnBrk="1" fontAlgn="auto" latinLnBrk="0" hangingPunct="1">
+              <a:lnSpc>
+                <a:spcPct val="100000"/>
+              </a:lnSpc>
+              <a:spcBef>
+                <a:spcPts val="0"/>
+              </a:spcBef>
+              <a:spcAft>
+                <a:spcPts val="0"/>
+              </a:spcAft>
+              <a:buClrTx/>
+              <a:buSzTx/>
+              <a:buFontTx/>
+              <a:buNone/>
+              <a:tabLst/>
+            </a:pPr>
+            <a:r>
+              <a:rPr lang="en-US" sz="1000" kern="0" dirty="0" smtClean="0">
+                <a:solidFill>
+                  <a:srgbClr val="000000"/>
+                </a:solidFill>
+                <a:latin typeface="Bosch Office Sans"/>
+              </a:rPr>
+              <a:t>Text3&lt;Dynamic</a:t>
+            </a:r>
+            <a:r>
+              <a:rPr lang="en-US" sz="1000" kern="0" dirty="0">
+                <a:solidFill>
+                  <a:srgbClr val="000000"/>
+                </a:solidFill>
+                <a:latin typeface="Bosch Office Sans"/>
+              </a:rPr>
+              <a:t>&gt;</a:t>
+            </a:r>
+            <a:endParaRPr lang="en-US" sz="1000" kern="0" dirty="0">
+              <a:solidFill>
+                <a:srgbClr val="000000"/>
+              </a:solidFill>
+              <a:latin typeface="Bosch Office Sans"/>
+            </a:endParaRPr>
+          </a:p>
+        </p:txBody>
+      </p:sp>
+      <p:sp>
+        <p:nvSpPr>
+          <p:cNvPr id="19" name="Rectangle 18"/>
+          <p:cNvSpPr/>
+          <p:nvPr/>
+        </p:nvSpPr>
+        <p:spPr>
+          <a:xfrm>
+            <a:off x="3707463" y="2860700"/>
+            <a:ext cx="2056973" cy="369332"/>
+          </a:xfrm>
+          <a:prstGeom prst="rect">
+            <a:avLst/>
+          </a:prstGeom>
+        </p:spPr>
+        <p:txBody>
+          <a:bodyPr wrap="none">
+            <a:spAutoFit/>
+          </a:bodyPr>
+          <a:lstStyle/>
+          <a:p>
+            <a:pPr marL="0" marR="0" indent="0" algn="ctr" defTabSz="914400" eaLnBrk="1" fontAlgn="auto" latinLnBrk="0" hangingPunct="1">
+              <a:lnSpc>
+                <a:spcPct val="100000"/>
+              </a:lnSpc>
+              <a:spcBef>
+                <a:spcPts val="0"/>
+              </a:spcBef>
+              <a:spcAft>
+                <a:spcPts val="0"/>
+              </a:spcAft>
+              <a:buClrTx/>
+              <a:buSzTx/>
+              <a:buFontTx/>
+              <a:buNone/>
+              <a:tabLst/>
+            </a:pPr>
+            <a:r>
+              <a:rPr lang="en-US" kern="0" dirty="0" smtClean="0">
+                <a:solidFill>
+                  <a:srgbClr val="000000"/>
+                </a:solidFill>
+                <a:latin typeface="Bosch Office Sans"/>
+              </a:rPr>
+              <a:t>Image &lt;Dynamic&gt;</a:t>
+            </a:r>
+            <a:endParaRPr lang="en-US" kern="0" dirty="0">
+              <a:solidFill>
+                <a:srgbClr val="000000"/>
+              </a:solidFill>
+              <a:latin typeface="Bosch Office Sans"/>
+            </a:endParaRPr>
+          </a:p>
+        </p:txBody>
+      </p:sp>
+      <p:sp>
+        <p:nvSpPr>
+          <p:cNvPr id="21" name="Rectangle 20"/>
+          <p:cNvSpPr/>
+          <p:nvPr/>
+        </p:nvSpPr>
+        <p:spPr>
+          <a:xfrm>
+            <a:off x="828160" y="3720413"/>
+            <a:ext cx="1332186" cy="436919"/>
+          </a:xfrm>
+          <a:prstGeom prst="rect">
+            <a:avLst/>
+          </a:prstGeom>
+          <a:noFill/>
+          <a:ln w="9525" cap="flat" cmpd="sng" algn="ctr">
+            <a:solidFill>
+              <a:srgbClr val="3F136C"/>
+            </a:solidFill>
+            <a:prstDash val="solid"/>
+          </a:ln>
+          <a:effectLst/>
+        </p:spPr>
+        <p:txBody>
+          <a:bodyPr rtlCol="0" anchor="ctr"/>
+          <a:lstStyle/>
+          <a:p>
+            <a:pPr marL="0" marR="0" indent="0" algn="ctr" defTabSz="914400" eaLnBrk="1" fontAlgn="auto" latinLnBrk="0" hangingPunct="1">
+              <a:lnSpc>
+                <a:spcPct val="100000"/>
+              </a:lnSpc>
+              <a:spcBef>
+                <a:spcPts val="0"/>
+              </a:spcBef>
+              <a:spcAft>
+                <a:spcPts val="0"/>
+              </a:spcAft>
+              <a:buClrTx/>
+              <a:buSzTx/>
+              <a:buFontTx/>
+              <a:buNone/>
+              <a:tabLst/>
+            </a:pPr>
+            <a:r>
+              <a:rPr kumimoji="0" lang="en-US" sz="1800" b="0" i="0" u="none" strike="noStrike" kern="0" cap="none" spc="0" normalizeH="0" baseline="0" noProof="0" dirty="0" smtClean="0">
+                <a:ln>
+                  <a:noFill/>
+                </a:ln>
+                <a:solidFill>
+                  <a:srgbClr val="000000"/>
+                </a:solidFill>
+                <a:effectLst/>
+                <a:uLnTx/>
+                <a:uFillTx/>
+                <a:latin typeface="Bosch Office Sans"/>
+                <a:ea typeface="+mn-ea"/>
+                <a:cs typeface="+mn-cs"/>
+              </a:rPr>
+              <a:t>Evaluate</a:t>
+            </a:r>
+            <a:endParaRPr kumimoji="0" lang="en-US" sz="1800" b="0" i="0" u="none" strike="noStrike" kern="0" cap="none" spc="0" normalizeH="0" baseline="0" noProof="0" dirty="0" smtClean="0">
+              <a:ln>
+                <a:noFill/>
+              </a:ln>
+              <a:solidFill>
+                <a:srgbClr val="000000"/>
+              </a:solidFill>
+              <a:effectLst/>
+              <a:uLnTx/>
+              <a:uFillTx/>
+              <a:latin typeface="Bosch Office Sans"/>
+              <a:ea typeface="+mn-ea"/>
+              <a:cs typeface="+mn-cs"/>
+            </a:endParaRPr>
+          </a:p>
+        </p:txBody>
+      </p:sp>
+    </p:spTree>
+    <p:extLst>
+      <p:ext uri="{BB962C8B-B14F-4D97-AF65-F5344CB8AC3E}">
+        <p14:creationId xmlns:p14="http://schemas.microsoft.com/office/powerpoint/2010/main" val="3661694646"/>
+      </p:ext>
+    </p:extLst>
+  </p:cSld>
+  <p:clrMapOvr>
+    <a:masterClrMapping/>
+  </p:clrMapOvr>
+</p:sld>
+</file>
+
+<file path=ppt/slides/slide19.xml><?xml version="1.0" encoding="utf-8"?>
+<p:sld xmlns:a="http://schemas.openxmlformats.org/drawingml/2006/main" xmlns:r="http://schemas.openxmlformats.org/officeDocument/2006/relationships" xmlns:p="http://schemas.openxmlformats.org/presentationml/2006/main">
+  <p:cSld>
+    <p:spTree>
+      <p:nvGrpSpPr>
+        <p:cNvPr id="1" name=""/>
+        <p:cNvGrpSpPr/>
+        <p:nvPr/>
+      </p:nvGrpSpPr>
+      <p:grpSpPr>
+        <a:xfrm>
+          <a:off x="0" y="0"/>
+          <a:ext cx="0" cy="0"/>
+          <a:chOff x="0" y="0"/>
+          <a:chExt cx="0" cy="0"/>
+        </a:xfrm>
+      </p:grpSpPr>
+      <p:sp>
+        <p:nvSpPr>
           <p:cNvPr id="2" name="Title 1"/>
           <p:cNvSpPr>
             <a:spLocks noGrp="1"/>
@@ -18943,6 +19935,33 @@
 </file>
 
 <file path=customXml/item1.xml><?xml version="1.0" encoding="utf-8"?>
+<sax_ColorSelect>
+  <Line>
+    <Color val="D70012"/>
+    <Color val="EA6876"/>
+    <Color val="a80163"/>
+    <Color val="D067AD"/>
+    <Color val="3f136c"/>
+    <Color val="967CB1"/>
+    <Color val="08427e"/>
+    <Color val="6D9ABC"/>
+    <Color val="0e78c5"/>
+    <Color val="6FB9E2"/>
+    <Color val="1399a0"/>
+    <Color val="6FC9CC"/>
+    <Color val="67b419"/>
+    <Color val="AEDB7D"/>
+    <Color val="0a5139"/>
+    <Color val="6EA293"/>
+    <Color val="999FA6"/>
+    <Color val="D7D7D7"/>
+    <Color val="000000"/>
+    <Color val="FFFFFF"/>
+  </Line>
+</sax_ColorSelect>
+</file>
+
+<file path=customXml/item2.xml><?xml version="1.0" encoding="utf-8"?>
 <saxML>
   <saxMLTemplate>presentation_169</saxMLTemplate>
   <Variablen>
@@ -19091,41 +20110,14 @@
 </saxML>
 </file>
 
-<file path=customXml/item2.xml><?xml version="1.0" encoding="utf-8"?>
-<sax_ColorSelect>
-  <Line>
-    <Color val="D70012"/>
-    <Color val="EA6876"/>
-    <Color val="a80163"/>
-    <Color val="D067AD"/>
-    <Color val="3f136c"/>
-    <Color val="967CB1"/>
-    <Color val="08427e"/>
-    <Color val="6D9ABC"/>
-    <Color val="0e78c5"/>
-    <Color val="6FB9E2"/>
-    <Color val="1399a0"/>
-    <Color val="6FC9CC"/>
-    <Color val="67b419"/>
-    <Color val="AEDB7D"/>
-    <Color val="0a5139"/>
-    <Color val="6EA293"/>
-    <Color val="999FA6"/>
-    <Color val="D7D7D7"/>
-    <Color val="000000"/>
-    <Color val="FFFFFF"/>
-  </Line>
-</sax_ColorSelect>
-</file>
-
 <file path=customXml/itemProps1.xml><?xml version="1.0" encoding="utf-8"?>
-<ds:datastoreItem xmlns:ds="http://schemas.openxmlformats.org/officeDocument/2006/customXml" ds:itemID="{D0252559-44F8-474C-B66D-E357B88E32C2}">
+<ds:datastoreItem xmlns:ds="http://schemas.openxmlformats.org/officeDocument/2006/customXml" ds:itemID="{304CF217-3C90-4AA0-B541-CE45F9BD305E}">
   <ds:schemaRefs/>
 </ds:datastoreItem>
 </file>
 
 <file path=customXml/itemProps2.xml><?xml version="1.0" encoding="utf-8"?>
-<ds:datastoreItem xmlns:ds="http://schemas.openxmlformats.org/officeDocument/2006/customXml" ds:itemID="{304CF217-3C90-4AA0-B541-CE45F9BD305E}">
+<ds:datastoreItem xmlns:ds="http://schemas.openxmlformats.org/officeDocument/2006/customXml" ds:itemID="{D0252559-44F8-474C-B66D-E357B88E32C2}">
   <ds:schemaRefs/>
 </ds:datastoreItem>
 </file>
</xml_diff>

<commit_message>
ppt 5th nov added
</commit_message>
<xml_diff>
--- a/intel_ocr/docs/intel_review_5thNov_V2.0.pptx
+++ b/intel_ocr/docs/intel_review_5thNov_V2.0.pptx
@@ -6,7 +6,7 @@
     <p:sldMasterId id="2147483748" r:id="rId4"/>
   </p:sldMasterIdLst>
   <p:notesMasterIdLst>
-    <p:notesMasterId r:id="rId23"/>
+    <p:notesMasterId r:id="rId24"/>
   </p:notesMasterIdLst>
   <p:sldIdLst>
     <p:sldId id="256" r:id="rId5"/>
@@ -26,12 +26,13 @@
     <p:sldId id="276" r:id="rId19"/>
     <p:sldId id="277" r:id="rId20"/>
     <p:sldId id="268" r:id="rId21"/>
-    <p:sldId id="267" r:id="rId22"/>
+    <p:sldId id="279" r:id="rId22"/>
+    <p:sldId id="267" r:id="rId23"/>
   </p:sldIdLst>
   <p:sldSz cx="10969625" cy="6170613"/>
   <p:notesSz cx="6858000" cy="9144000"/>
   <p:custDataLst>
-    <p:tags r:id="rId24"/>
+    <p:tags r:id="rId25"/>
   </p:custDataLst>
   <p:defaultTextStyle>
     <a:defPPr>
@@ -13917,6 +13918,959 @@
       </p:grpSpPr>
       <p:sp>
         <p:nvSpPr>
+          <p:cNvPr id="2" name="Text Placeholder 1"/>
+          <p:cNvSpPr>
+            <a:spLocks noGrp="1"/>
+          </p:cNvSpPr>
+          <p:nvPr>
+            <p:ph type="body" sz="quarter" idx="15"/>
+          </p:nvPr>
+        </p:nvSpPr>
+        <p:spPr/>
+        <p:txBody>
+          <a:bodyPr/>
+          <a:lstStyle/>
+          <a:p>
+            <a:r>
+              <a:rPr lang="en-US" smtClean="0"/>
+              <a:t>GUI</a:t>
+            </a:r>
+            <a:endParaRPr lang="en-US"/>
+          </a:p>
+        </p:txBody>
+      </p:sp>
+      <p:sp>
+        <p:nvSpPr>
+          <p:cNvPr id="6" name="Slide Number Placeholder 5"/>
+          <p:cNvSpPr>
+            <a:spLocks noGrp="1"/>
+          </p:cNvSpPr>
+          <p:nvPr>
+            <p:ph type="sldNum" sz="quarter" idx="12"/>
+          </p:nvPr>
+        </p:nvSpPr>
+        <p:spPr/>
+        <p:txBody>
+          <a:bodyPr/>
+          <a:lstStyle/>
+          <a:p>
+            <a:fld id="{4898AEC0-503E-4FA4-859C-D0F72D6E3F79}" type="slidenum">
+              <a:rPr lang="de-DE" smtClean="0"/>
+              <a:pPr/>
+              <a:t>18</a:t>
+            </a:fld>
+            <a:endParaRPr lang="de-DE"/>
+          </a:p>
+        </p:txBody>
+      </p:sp>
+      <p:sp>
+        <p:nvSpPr>
+          <p:cNvPr id="7" name="Rectangle 6"/>
+          <p:cNvSpPr/>
+          <p:nvPr/>
+        </p:nvSpPr>
+        <p:spPr>
+          <a:xfrm>
+            <a:off x="266700" y="772510"/>
+            <a:ext cx="10443300" cy="4658711"/>
+          </a:xfrm>
+          <a:prstGeom prst="rect">
+            <a:avLst/>
+          </a:prstGeom>
+          <a:noFill/>
+          <a:ln w="9525" cap="flat" cmpd="sng" algn="ctr">
+            <a:solidFill>
+              <a:srgbClr val="3F136C"/>
+            </a:solidFill>
+            <a:prstDash val="solid"/>
+          </a:ln>
+          <a:effectLst/>
+        </p:spPr>
+        <p:txBody>
+          <a:bodyPr rtlCol="0" anchor="ctr"/>
+          <a:lstStyle/>
+          <a:p>
+            <a:pPr marL="0" marR="0" indent="0" algn="ctr" defTabSz="914400" eaLnBrk="1" fontAlgn="auto" latinLnBrk="0" hangingPunct="1">
+              <a:lnSpc>
+                <a:spcPct val="100000"/>
+              </a:lnSpc>
+              <a:spcBef>
+                <a:spcPts val="0"/>
+              </a:spcBef>
+              <a:spcAft>
+                <a:spcPts val="0"/>
+              </a:spcAft>
+              <a:buClrTx/>
+              <a:buSzTx/>
+              <a:buFontTx/>
+              <a:buNone/>
+              <a:tabLst/>
+            </a:pPr>
+            <a:endParaRPr kumimoji="0" lang="en-US" sz="1800" b="0" i="0" u="none" strike="noStrike" kern="0" cap="none" spc="0" normalizeH="0" baseline="0" noProof="0" dirty="0" smtClean="0">
+              <a:ln>
+                <a:noFill/>
+              </a:ln>
+              <a:solidFill>
+                <a:srgbClr val="000000"/>
+              </a:solidFill>
+              <a:effectLst/>
+              <a:uLnTx/>
+              <a:uFillTx/>
+              <a:latin typeface="Bosch Office Sans"/>
+              <a:ea typeface="+mn-ea"/>
+              <a:cs typeface="+mn-cs"/>
+            </a:endParaRPr>
+          </a:p>
+        </p:txBody>
+      </p:sp>
+      <p:sp>
+        <p:nvSpPr>
+          <p:cNvPr id="8" name="Rectangle 7"/>
+          <p:cNvSpPr/>
+          <p:nvPr/>
+        </p:nvSpPr>
+        <p:spPr>
+          <a:xfrm>
+            <a:off x="410845" y="1008993"/>
+            <a:ext cx="2166817" cy="441435"/>
+          </a:xfrm>
+          <a:prstGeom prst="rect">
+            <a:avLst/>
+          </a:prstGeom>
+          <a:noFill/>
+          <a:ln w="9525" cap="flat" cmpd="sng" algn="ctr">
+            <a:solidFill>
+              <a:srgbClr val="3F136C"/>
+            </a:solidFill>
+            <a:prstDash val="solid"/>
+          </a:ln>
+          <a:effectLst/>
+        </p:spPr>
+        <p:txBody>
+          <a:bodyPr rtlCol="0" anchor="ctr"/>
+          <a:lstStyle/>
+          <a:p>
+            <a:pPr marL="0" marR="0" indent="0" algn="ctr" defTabSz="914400" eaLnBrk="1" fontAlgn="auto" latinLnBrk="0" hangingPunct="1">
+              <a:lnSpc>
+                <a:spcPct val="100000"/>
+              </a:lnSpc>
+              <a:spcBef>
+                <a:spcPts val="0"/>
+              </a:spcBef>
+              <a:spcAft>
+                <a:spcPts val="0"/>
+              </a:spcAft>
+              <a:buClrTx/>
+              <a:buSzTx/>
+              <a:buFontTx/>
+              <a:buNone/>
+              <a:tabLst/>
+            </a:pPr>
+            <a:r>
+              <a:rPr kumimoji="0" lang="en-US" sz="1800" b="0" i="0" u="none" strike="noStrike" kern="0" cap="none" spc="0" normalizeH="0" baseline="0" noProof="0" dirty="0" smtClean="0">
+                <a:ln>
+                  <a:noFill/>
+                </a:ln>
+                <a:solidFill>
+                  <a:srgbClr val="000000"/>
+                </a:solidFill>
+                <a:effectLst/>
+                <a:uLnTx/>
+                <a:uFillTx/>
+                <a:latin typeface="Bosch Office Sans"/>
+                <a:ea typeface="+mn-ea"/>
+                <a:cs typeface="+mn-cs"/>
+              </a:rPr>
+              <a:t>Equation</a:t>
+            </a:r>
+            <a:r>
+              <a:rPr kumimoji="0" lang="en-US" sz="1800" b="0" i="0" u="none" strike="noStrike" kern="0" cap="none" spc="0" normalizeH="0" noProof="0" dirty="0" smtClean="0">
+                <a:ln>
+                  <a:noFill/>
+                </a:ln>
+                <a:solidFill>
+                  <a:srgbClr val="000000"/>
+                </a:solidFill>
+                <a:effectLst/>
+                <a:uLnTx/>
+                <a:uFillTx/>
+                <a:latin typeface="Bosch Office Sans"/>
+                <a:ea typeface="+mn-ea"/>
+                <a:cs typeface="+mn-cs"/>
+              </a:rPr>
+              <a:t> 1&lt;Static&gt;</a:t>
+            </a:r>
+            <a:endParaRPr kumimoji="0" lang="en-US" sz="1800" b="0" i="0" u="none" strike="noStrike" kern="0" cap="none" spc="0" normalizeH="0" baseline="0" noProof="0" dirty="0" smtClean="0">
+              <a:ln>
+                <a:noFill/>
+              </a:ln>
+              <a:solidFill>
+                <a:srgbClr val="000000"/>
+              </a:solidFill>
+              <a:effectLst/>
+              <a:uLnTx/>
+              <a:uFillTx/>
+              <a:latin typeface="Bosch Office Sans"/>
+              <a:ea typeface="+mn-ea"/>
+              <a:cs typeface="+mn-cs"/>
+            </a:endParaRPr>
+          </a:p>
+        </p:txBody>
+      </p:sp>
+      <p:sp>
+        <p:nvSpPr>
+          <p:cNvPr id="9" name="Rectangle 8"/>
+          <p:cNvSpPr/>
+          <p:nvPr/>
+        </p:nvSpPr>
+        <p:spPr>
+          <a:xfrm>
+            <a:off x="410845" y="1702677"/>
+            <a:ext cx="2166817" cy="441435"/>
+          </a:xfrm>
+          <a:prstGeom prst="rect">
+            <a:avLst/>
+          </a:prstGeom>
+          <a:noFill/>
+          <a:ln w="9525" cap="flat" cmpd="sng" algn="ctr">
+            <a:solidFill>
+              <a:srgbClr val="3F136C"/>
+            </a:solidFill>
+            <a:prstDash val="solid"/>
+          </a:ln>
+          <a:effectLst/>
+        </p:spPr>
+        <p:txBody>
+          <a:bodyPr rtlCol="0" anchor="ctr"/>
+          <a:lstStyle/>
+          <a:p>
+            <a:pPr marL="0" marR="0" indent="0" algn="ctr" defTabSz="914400" eaLnBrk="1" fontAlgn="auto" latinLnBrk="0" hangingPunct="1">
+              <a:lnSpc>
+                <a:spcPct val="100000"/>
+              </a:lnSpc>
+              <a:spcBef>
+                <a:spcPts val="0"/>
+              </a:spcBef>
+              <a:spcAft>
+                <a:spcPts val="0"/>
+              </a:spcAft>
+              <a:buClrTx/>
+              <a:buSzTx/>
+              <a:buFontTx/>
+              <a:buNone/>
+              <a:tabLst/>
+            </a:pPr>
+            <a:r>
+              <a:rPr lang="en-US" kern="0" dirty="0">
+                <a:solidFill>
+                  <a:srgbClr val="000000"/>
+                </a:solidFill>
+                <a:latin typeface="Bosch Office Sans"/>
+              </a:rPr>
+              <a:t>Equation </a:t>
+            </a:r>
+            <a:r>
+              <a:rPr lang="en-US" kern="0" dirty="0" smtClean="0">
+                <a:solidFill>
+                  <a:srgbClr val="000000"/>
+                </a:solidFill>
+                <a:latin typeface="Bosch Office Sans"/>
+              </a:rPr>
+              <a:t>2&lt;Static</a:t>
+            </a:r>
+            <a:r>
+              <a:rPr lang="en-US" kern="0" dirty="0">
+                <a:solidFill>
+                  <a:srgbClr val="000000"/>
+                </a:solidFill>
+                <a:latin typeface="Bosch Office Sans"/>
+              </a:rPr>
+              <a:t>&gt;</a:t>
+            </a:r>
+          </a:p>
+        </p:txBody>
+      </p:sp>
+      <p:sp>
+        <p:nvSpPr>
+          <p:cNvPr id="10" name="Rectangle 9"/>
+          <p:cNvSpPr/>
+          <p:nvPr/>
+        </p:nvSpPr>
+        <p:spPr>
+          <a:xfrm>
+            <a:off x="410845" y="2442009"/>
+            <a:ext cx="2166817" cy="441435"/>
+          </a:xfrm>
+          <a:prstGeom prst="rect">
+            <a:avLst/>
+          </a:prstGeom>
+          <a:noFill/>
+          <a:ln w="9525" cap="flat" cmpd="sng" algn="ctr">
+            <a:solidFill>
+              <a:srgbClr val="3F136C"/>
+            </a:solidFill>
+            <a:prstDash val="solid"/>
+          </a:ln>
+          <a:effectLst/>
+        </p:spPr>
+        <p:txBody>
+          <a:bodyPr rtlCol="0" anchor="ctr"/>
+          <a:lstStyle/>
+          <a:p>
+            <a:pPr marL="0" marR="0" indent="0" algn="ctr" defTabSz="914400" eaLnBrk="1" fontAlgn="auto" latinLnBrk="0" hangingPunct="1">
+              <a:lnSpc>
+                <a:spcPct val="100000"/>
+              </a:lnSpc>
+              <a:spcBef>
+                <a:spcPts val="0"/>
+              </a:spcBef>
+              <a:spcAft>
+                <a:spcPts val="0"/>
+              </a:spcAft>
+              <a:buClrTx/>
+              <a:buSzTx/>
+              <a:buFontTx/>
+              <a:buNone/>
+              <a:tabLst/>
+            </a:pPr>
+            <a:r>
+              <a:rPr lang="en-US" kern="0" dirty="0">
+                <a:solidFill>
+                  <a:srgbClr val="000000"/>
+                </a:solidFill>
+                <a:latin typeface="Bosch Office Sans"/>
+              </a:rPr>
+              <a:t>Equation </a:t>
+            </a:r>
+            <a:r>
+              <a:rPr lang="en-US" kern="0" dirty="0" smtClean="0">
+                <a:solidFill>
+                  <a:srgbClr val="000000"/>
+                </a:solidFill>
+                <a:latin typeface="Bosch Office Sans"/>
+              </a:rPr>
+              <a:t>3&lt;Static</a:t>
+            </a:r>
+            <a:r>
+              <a:rPr lang="en-US" kern="0" dirty="0">
+                <a:solidFill>
+                  <a:srgbClr val="000000"/>
+                </a:solidFill>
+                <a:latin typeface="Bosch Office Sans"/>
+              </a:rPr>
+              <a:t>&gt;</a:t>
+            </a:r>
+          </a:p>
+        </p:txBody>
+      </p:sp>
+      <p:sp>
+        <p:nvSpPr>
+          <p:cNvPr id="11" name="Rectangle 10"/>
+          <p:cNvSpPr/>
+          <p:nvPr/>
+        </p:nvSpPr>
+        <p:spPr>
+          <a:xfrm>
+            <a:off x="2956032" y="1008993"/>
+            <a:ext cx="3318641" cy="4300220"/>
+          </a:xfrm>
+          <a:prstGeom prst="rect">
+            <a:avLst/>
+          </a:prstGeom>
+          <a:noFill/>
+          <a:ln w="9525" cap="flat" cmpd="sng" algn="ctr">
+            <a:solidFill>
+              <a:srgbClr val="3F136C"/>
+            </a:solidFill>
+            <a:prstDash val="solid"/>
+          </a:ln>
+          <a:effectLst/>
+        </p:spPr>
+        <p:txBody>
+          <a:bodyPr rtlCol="0" anchor="ctr"/>
+          <a:lstStyle/>
+          <a:p>
+            <a:pPr marL="0" marR="0" indent="0" algn="ctr" defTabSz="914400" eaLnBrk="1" fontAlgn="auto" latinLnBrk="0" hangingPunct="1">
+              <a:lnSpc>
+                <a:spcPct val="100000"/>
+              </a:lnSpc>
+              <a:spcBef>
+                <a:spcPts val="0"/>
+              </a:spcBef>
+              <a:spcAft>
+                <a:spcPts val="0"/>
+              </a:spcAft>
+              <a:buClrTx/>
+              <a:buSzTx/>
+              <a:buFontTx/>
+              <a:buNone/>
+              <a:tabLst/>
+            </a:pPr>
+            <a:endParaRPr kumimoji="0" lang="en-US" sz="1800" b="0" i="0" u="none" strike="noStrike" kern="0" cap="none" spc="0" normalizeH="0" baseline="0" noProof="0" dirty="0" smtClean="0">
+              <a:ln>
+                <a:noFill/>
+              </a:ln>
+              <a:solidFill>
+                <a:srgbClr val="000000"/>
+              </a:solidFill>
+              <a:effectLst/>
+              <a:uLnTx/>
+              <a:uFillTx/>
+              <a:latin typeface="Bosch Office Sans"/>
+              <a:ea typeface="+mn-ea"/>
+              <a:cs typeface="+mn-cs"/>
+            </a:endParaRPr>
+          </a:p>
+        </p:txBody>
+      </p:sp>
+      <p:sp>
+        <p:nvSpPr>
+          <p:cNvPr id="12" name="Rectangle 11"/>
+          <p:cNvSpPr/>
+          <p:nvPr/>
+        </p:nvSpPr>
+        <p:spPr>
+          <a:xfrm>
+            <a:off x="6395544" y="1008993"/>
+            <a:ext cx="3318641" cy="1381541"/>
+          </a:xfrm>
+          <a:prstGeom prst="rect">
+            <a:avLst/>
+          </a:prstGeom>
+          <a:noFill/>
+          <a:ln w="9525" cap="flat" cmpd="sng" algn="ctr">
+            <a:solidFill>
+              <a:srgbClr val="3F136C"/>
+            </a:solidFill>
+            <a:prstDash val="solid"/>
+          </a:ln>
+          <a:effectLst/>
+        </p:spPr>
+        <p:txBody>
+          <a:bodyPr rtlCol="0" anchor="ctr"/>
+          <a:lstStyle/>
+          <a:p>
+            <a:pPr marL="0" marR="0" indent="0" algn="ctr" defTabSz="914400" eaLnBrk="1" fontAlgn="auto" latinLnBrk="0" hangingPunct="1">
+              <a:lnSpc>
+                <a:spcPct val="100000"/>
+              </a:lnSpc>
+              <a:spcBef>
+                <a:spcPts val="0"/>
+              </a:spcBef>
+              <a:spcAft>
+                <a:spcPts val="0"/>
+              </a:spcAft>
+              <a:buClrTx/>
+              <a:buSzTx/>
+              <a:buFontTx/>
+              <a:buNone/>
+              <a:tabLst/>
+            </a:pPr>
+            <a:r>
+              <a:rPr lang="en-US" kern="0" dirty="0" smtClean="0">
+                <a:solidFill>
+                  <a:srgbClr val="000000"/>
+                </a:solidFill>
+                <a:latin typeface="Bosch Office Sans"/>
+              </a:rPr>
+              <a:t>Output 1 Image&lt;Dynamic&gt;</a:t>
+            </a:r>
+            <a:endParaRPr lang="en-US" kern="0" dirty="0">
+              <a:solidFill>
+                <a:srgbClr val="000000"/>
+              </a:solidFill>
+              <a:latin typeface="Bosch Office Sans"/>
+            </a:endParaRPr>
+          </a:p>
+        </p:txBody>
+      </p:sp>
+      <p:sp>
+        <p:nvSpPr>
+          <p:cNvPr id="13" name="Rectangle 12"/>
+          <p:cNvSpPr/>
+          <p:nvPr/>
+        </p:nvSpPr>
+        <p:spPr>
+          <a:xfrm>
+            <a:off x="6395542" y="2390534"/>
+            <a:ext cx="3318641" cy="1448369"/>
+          </a:xfrm>
+          <a:prstGeom prst="rect">
+            <a:avLst/>
+          </a:prstGeom>
+          <a:noFill/>
+          <a:ln w="9525" cap="flat" cmpd="sng" algn="ctr">
+            <a:solidFill>
+              <a:srgbClr val="3F136C"/>
+            </a:solidFill>
+            <a:prstDash val="solid"/>
+          </a:ln>
+          <a:effectLst/>
+        </p:spPr>
+        <p:txBody>
+          <a:bodyPr rtlCol="0" anchor="ctr"/>
+          <a:lstStyle/>
+          <a:p>
+            <a:pPr marL="0" marR="0" indent="0" algn="ctr" defTabSz="914400" eaLnBrk="1" fontAlgn="auto" latinLnBrk="0" hangingPunct="1">
+              <a:lnSpc>
+                <a:spcPct val="100000"/>
+              </a:lnSpc>
+              <a:spcBef>
+                <a:spcPts val="0"/>
+              </a:spcBef>
+              <a:spcAft>
+                <a:spcPts val="0"/>
+              </a:spcAft>
+              <a:buClrTx/>
+              <a:buSzTx/>
+              <a:buFontTx/>
+              <a:buNone/>
+              <a:tabLst/>
+            </a:pPr>
+            <a:r>
+              <a:rPr lang="en-US" kern="0" dirty="0">
+                <a:solidFill>
+                  <a:srgbClr val="000000"/>
+                </a:solidFill>
+                <a:latin typeface="Bosch Office Sans"/>
+              </a:rPr>
+              <a:t>Output </a:t>
+            </a:r>
+            <a:r>
+              <a:rPr lang="en-US" kern="0" dirty="0" smtClean="0">
+                <a:solidFill>
+                  <a:srgbClr val="000000"/>
+                </a:solidFill>
+                <a:latin typeface="Bosch Office Sans"/>
+              </a:rPr>
+              <a:t>2 Image&lt;Dynamic</a:t>
+            </a:r>
+            <a:r>
+              <a:rPr lang="en-US" kern="0" dirty="0">
+                <a:solidFill>
+                  <a:srgbClr val="000000"/>
+                </a:solidFill>
+                <a:latin typeface="Bosch Office Sans"/>
+              </a:rPr>
+              <a:t>&gt;</a:t>
+            </a:r>
+          </a:p>
+        </p:txBody>
+      </p:sp>
+      <p:sp>
+        <p:nvSpPr>
+          <p:cNvPr id="14" name="Rectangle 13"/>
+          <p:cNvSpPr/>
+          <p:nvPr/>
+        </p:nvSpPr>
+        <p:spPr>
+          <a:xfrm>
+            <a:off x="6395543" y="3838903"/>
+            <a:ext cx="3318641" cy="1468664"/>
+          </a:xfrm>
+          <a:prstGeom prst="rect">
+            <a:avLst/>
+          </a:prstGeom>
+          <a:noFill/>
+          <a:ln w="9525" cap="flat" cmpd="sng" algn="ctr">
+            <a:solidFill>
+              <a:srgbClr val="3F136C"/>
+            </a:solidFill>
+            <a:prstDash val="solid"/>
+          </a:ln>
+          <a:effectLst/>
+        </p:spPr>
+        <p:txBody>
+          <a:bodyPr rtlCol="0" anchor="ctr"/>
+          <a:lstStyle/>
+          <a:p>
+            <a:pPr marL="0" marR="0" indent="0" algn="ctr" defTabSz="914400" eaLnBrk="1" fontAlgn="auto" latinLnBrk="0" hangingPunct="1">
+              <a:lnSpc>
+                <a:spcPct val="100000"/>
+              </a:lnSpc>
+              <a:spcBef>
+                <a:spcPts val="0"/>
+              </a:spcBef>
+              <a:spcAft>
+                <a:spcPts val="0"/>
+              </a:spcAft>
+              <a:buClrTx/>
+              <a:buSzTx/>
+              <a:buFontTx/>
+              <a:buNone/>
+              <a:tabLst/>
+            </a:pPr>
+            <a:r>
+              <a:rPr lang="en-US" kern="0" dirty="0">
+                <a:solidFill>
+                  <a:srgbClr val="000000"/>
+                </a:solidFill>
+                <a:latin typeface="Bosch Office Sans"/>
+              </a:rPr>
+              <a:t>Output </a:t>
+            </a:r>
+            <a:r>
+              <a:rPr lang="en-US" kern="0" dirty="0" smtClean="0">
+                <a:solidFill>
+                  <a:srgbClr val="000000"/>
+                </a:solidFill>
+                <a:latin typeface="Bosch Office Sans"/>
+              </a:rPr>
+              <a:t>3 Image&lt;Dynamic</a:t>
+            </a:r>
+            <a:r>
+              <a:rPr lang="en-US" kern="0" dirty="0">
+                <a:solidFill>
+                  <a:srgbClr val="000000"/>
+                </a:solidFill>
+                <a:latin typeface="Bosch Office Sans"/>
+              </a:rPr>
+              <a:t>&gt;</a:t>
+            </a:r>
+          </a:p>
+        </p:txBody>
+      </p:sp>
+      <p:sp>
+        <p:nvSpPr>
+          <p:cNvPr id="15" name="Rectangle 14"/>
+          <p:cNvSpPr/>
+          <p:nvPr/>
+        </p:nvSpPr>
+        <p:spPr>
+          <a:xfrm>
+            <a:off x="9800485" y="1251631"/>
+            <a:ext cx="817592" cy="541284"/>
+          </a:xfrm>
+          <a:prstGeom prst="rect">
+            <a:avLst/>
+          </a:prstGeom>
+          <a:noFill/>
+          <a:ln w="9525" cap="flat" cmpd="sng" algn="ctr">
+            <a:solidFill>
+              <a:srgbClr val="3F136C"/>
+            </a:solidFill>
+            <a:prstDash val="solid"/>
+          </a:ln>
+          <a:effectLst/>
+        </p:spPr>
+        <p:txBody>
+          <a:bodyPr rtlCol="0" anchor="ctr"/>
+          <a:lstStyle/>
+          <a:p>
+            <a:pPr marL="0" marR="0" indent="0" algn="ctr" defTabSz="914400" eaLnBrk="1" fontAlgn="auto" latinLnBrk="0" hangingPunct="1">
+              <a:lnSpc>
+                <a:spcPct val="100000"/>
+              </a:lnSpc>
+              <a:spcBef>
+                <a:spcPts val="0"/>
+              </a:spcBef>
+              <a:spcAft>
+                <a:spcPts val="0"/>
+              </a:spcAft>
+              <a:buClrTx/>
+              <a:buSzTx/>
+              <a:buFontTx/>
+              <a:buNone/>
+              <a:tabLst/>
+            </a:pPr>
+            <a:r>
+              <a:rPr kumimoji="0" lang="en-US" sz="1000" b="0" i="0" u="none" strike="noStrike" kern="0" cap="none" spc="0" normalizeH="0" baseline="0" noProof="0" dirty="0" smtClean="0">
+                <a:ln>
+                  <a:noFill/>
+                </a:ln>
+                <a:solidFill>
+                  <a:srgbClr val="000000"/>
+                </a:solidFill>
+                <a:effectLst/>
+                <a:uLnTx/>
+                <a:uFillTx/>
+                <a:latin typeface="Bosch Office Sans"/>
+                <a:ea typeface="+mn-ea"/>
+                <a:cs typeface="+mn-cs"/>
+              </a:rPr>
+              <a:t>Text1&lt;Dynamic&gt;</a:t>
+            </a:r>
+          </a:p>
+        </p:txBody>
+      </p:sp>
+      <p:sp>
+        <p:nvSpPr>
+          <p:cNvPr id="16" name="Rectangle 15"/>
+          <p:cNvSpPr/>
+          <p:nvPr/>
+        </p:nvSpPr>
+        <p:spPr>
+          <a:xfrm>
+            <a:off x="9800485" y="2860700"/>
+            <a:ext cx="817592" cy="541284"/>
+          </a:xfrm>
+          <a:prstGeom prst="rect">
+            <a:avLst/>
+          </a:prstGeom>
+          <a:noFill/>
+          <a:ln w="9525" cap="flat" cmpd="sng" algn="ctr">
+            <a:solidFill>
+              <a:srgbClr val="3F136C"/>
+            </a:solidFill>
+            <a:prstDash val="solid"/>
+          </a:ln>
+          <a:effectLst/>
+        </p:spPr>
+        <p:txBody>
+          <a:bodyPr rtlCol="0" anchor="ctr"/>
+          <a:lstStyle/>
+          <a:p>
+            <a:pPr marL="0" marR="0" indent="0" algn="ctr" defTabSz="914400" eaLnBrk="1" fontAlgn="auto" latinLnBrk="0" hangingPunct="1">
+              <a:lnSpc>
+                <a:spcPct val="100000"/>
+              </a:lnSpc>
+              <a:spcBef>
+                <a:spcPts val="0"/>
+              </a:spcBef>
+              <a:spcAft>
+                <a:spcPts val="0"/>
+              </a:spcAft>
+              <a:buClrTx/>
+              <a:buSzTx/>
+              <a:buFontTx/>
+              <a:buNone/>
+              <a:tabLst/>
+            </a:pPr>
+            <a:r>
+              <a:rPr lang="en-US" sz="1050" kern="0" dirty="0" smtClean="0">
+                <a:solidFill>
+                  <a:srgbClr val="000000"/>
+                </a:solidFill>
+                <a:latin typeface="Bosch Office Sans"/>
+              </a:rPr>
+              <a:t>Text2&lt;Dynamic</a:t>
+            </a:r>
+            <a:r>
+              <a:rPr lang="en-US" sz="1050" kern="0" dirty="0">
+                <a:solidFill>
+                  <a:srgbClr val="000000"/>
+                </a:solidFill>
+                <a:latin typeface="Bosch Office Sans"/>
+              </a:rPr>
+              <a:t>&gt;</a:t>
+            </a:r>
+          </a:p>
+        </p:txBody>
+      </p:sp>
+      <p:sp>
+        <p:nvSpPr>
+          <p:cNvPr id="17" name="Rectangle 16"/>
+          <p:cNvSpPr/>
+          <p:nvPr/>
+        </p:nvSpPr>
+        <p:spPr>
+          <a:xfrm>
+            <a:off x="9800485" y="4400465"/>
+            <a:ext cx="817592" cy="541284"/>
+          </a:xfrm>
+          <a:prstGeom prst="rect">
+            <a:avLst/>
+          </a:prstGeom>
+          <a:noFill/>
+          <a:ln w="9525" cap="flat" cmpd="sng" algn="ctr">
+            <a:solidFill>
+              <a:srgbClr val="3F136C"/>
+            </a:solidFill>
+            <a:prstDash val="solid"/>
+          </a:ln>
+          <a:effectLst/>
+        </p:spPr>
+        <p:txBody>
+          <a:bodyPr rtlCol="0" anchor="ctr"/>
+          <a:lstStyle/>
+          <a:p>
+            <a:pPr marL="0" marR="0" indent="0" algn="ctr" defTabSz="914400" eaLnBrk="1" fontAlgn="auto" latinLnBrk="0" hangingPunct="1">
+              <a:lnSpc>
+                <a:spcPct val="100000"/>
+              </a:lnSpc>
+              <a:spcBef>
+                <a:spcPts val="0"/>
+              </a:spcBef>
+              <a:spcAft>
+                <a:spcPts val="0"/>
+              </a:spcAft>
+              <a:buClrTx/>
+              <a:buSzTx/>
+              <a:buFontTx/>
+              <a:buNone/>
+              <a:tabLst/>
+            </a:pPr>
+            <a:r>
+              <a:rPr lang="en-US" sz="1000" kern="0" dirty="0" smtClean="0">
+                <a:solidFill>
+                  <a:srgbClr val="000000"/>
+                </a:solidFill>
+                <a:latin typeface="Bosch Office Sans"/>
+              </a:rPr>
+              <a:t>Text3&lt;Dynamic</a:t>
+            </a:r>
+            <a:r>
+              <a:rPr lang="en-US" sz="1000" kern="0" dirty="0">
+                <a:solidFill>
+                  <a:srgbClr val="000000"/>
+                </a:solidFill>
+                <a:latin typeface="Bosch Office Sans"/>
+              </a:rPr>
+              <a:t>&gt;</a:t>
+            </a:r>
+          </a:p>
+        </p:txBody>
+      </p:sp>
+      <p:sp>
+        <p:nvSpPr>
+          <p:cNvPr id="19" name="Rectangle 18"/>
+          <p:cNvSpPr/>
+          <p:nvPr/>
+        </p:nvSpPr>
+        <p:spPr>
+          <a:xfrm>
+            <a:off x="3707463" y="2860700"/>
+            <a:ext cx="2056973" cy="369332"/>
+          </a:xfrm>
+          <a:prstGeom prst="rect">
+            <a:avLst/>
+          </a:prstGeom>
+        </p:spPr>
+        <p:txBody>
+          <a:bodyPr wrap="none">
+            <a:spAutoFit/>
+          </a:bodyPr>
+          <a:lstStyle/>
+          <a:p>
+            <a:pPr marL="0" marR="0" indent="0" algn="ctr" defTabSz="914400" eaLnBrk="1" fontAlgn="auto" latinLnBrk="0" hangingPunct="1">
+              <a:lnSpc>
+                <a:spcPct val="100000"/>
+              </a:lnSpc>
+              <a:spcBef>
+                <a:spcPts val="0"/>
+              </a:spcBef>
+              <a:spcAft>
+                <a:spcPts val="0"/>
+              </a:spcAft>
+              <a:buClrTx/>
+              <a:buSzTx/>
+              <a:buFontTx/>
+              <a:buNone/>
+              <a:tabLst/>
+            </a:pPr>
+            <a:r>
+              <a:rPr lang="en-US" kern="0" dirty="0" smtClean="0">
+                <a:solidFill>
+                  <a:srgbClr val="000000"/>
+                </a:solidFill>
+                <a:latin typeface="Bosch Office Sans"/>
+              </a:rPr>
+              <a:t>Image &lt;Dynamic&gt;</a:t>
+            </a:r>
+            <a:endParaRPr lang="en-US" kern="0" dirty="0">
+              <a:solidFill>
+                <a:srgbClr val="000000"/>
+              </a:solidFill>
+              <a:latin typeface="Bosch Office Sans"/>
+            </a:endParaRPr>
+          </a:p>
+        </p:txBody>
+      </p:sp>
+      <p:sp>
+        <p:nvSpPr>
+          <p:cNvPr id="21" name="Rectangle 20"/>
+          <p:cNvSpPr/>
+          <p:nvPr/>
+        </p:nvSpPr>
+        <p:spPr>
+          <a:xfrm>
+            <a:off x="828160" y="3720413"/>
+            <a:ext cx="1332186" cy="436919"/>
+          </a:xfrm>
+          <a:prstGeom prst="rect">
+            <a:avLst/>
+          </a:prstGeom>
+          <a:noFill/>
+          <a:ln w="9525" cap="flat" cmpd="sng" algn="ctr">
+            <a:solidFill>
+              <a:srgbClr val="3F136C"/>
+            </a:solidFill>
+            <a:prstDash val="solid"/>
+          </a:ln>
+          <a:effectLst/>
+        </p:spPr>
+        <p:txBody>
+          <a:bodyPr rtlCol="0" anchor="ctr"/>
+          <a:lstStyle/>
+          <a:p>
+            <a:pPr marL="0" marR="0" indent="0" algn="ctr" defTabSz="914400" eaLnBrk="1" fontAlgn="auto" latinLnBrk="0" hangingPunct="1">
+              <a:lnSpc>
+                <a:spcPct val="100000"/>
+              </a:lnSpc>
+              <a:spcBef>
+                <a:spcPts val="0"/>
+              </a:spcBef>
+              <a:spcAft>
+                <a:spcPts val="0"/>
+              </a:spcAft>
+              <a:buClrTx/>
+              <a:buSzTx/>
+              <a:buFontTx/>
+              <a:buNone/>
+              <a:tabLst/>
+            </a:pPr>
+            <a:r>
+              <a:rPr kumimoji="0" lang="en-US" sz="1800" b="0" i="0" u="none" strike="noStrike" kern="0" cap="none" spc="0" normalizeH="0" baseline="0" noProof="0" dirty="0" smtClean="0">
+                <a:ln>
+                  <a:noFill/>
+                </a:ln>
+                <a:solidFill>
+                  <a:srgbClr val="000000"/>
+                </a:solidFill>
+                <a:effectLst/>
+                <a:uLnTx/>
+                <a:uFillTx/>
+                <a:latin typeface="Bosch Office Sans"/>
+                <a:ea typeface="+mn-ea"/>
+                <a:cs typeface="+mn-cs"/>
+              </a:rPr>
+              <a:t>Evaluate</a:t>
+            </a:r>
+          </a:p>
+        </p:txBody>
+      </p:sp>
+    </p:spTree>
+    <p:extLst>
+      <p:ext uri="{BB962C8B-B14F-4D97-AF65-F5344CB8AC3E}">
+        <p14:creationId xmlns:p14="http://schemas.microsoft.com/office/powerpoint/2010/main" val="3661694646"/>
+      </p:ext>
+    </p:extLst>
+  </p:cSld>
+  <p:clrMapOvr>
+    <a:masterClrMapping/>
+  </p:clrMapOvr>
+</p:sld>
+</file>
+
+<file path=ppt/slides/slide19.xml><?xml version="1.0" encoding="utf-8"?>
+<p:sld xmlns:a="http://schemas.openxmlformats.org/drawingml/2006/main" xmlns:r="http://schemas.openxmlformats.org/officeDocument/2006/relationships" xmlns:p="http://schemas.openxmlformats.org/presentationml/2006/main">
+  <p:cSld>
+    <p:spTree>
+      <p:nvGrpSpPr>
+        <p:cNvPr id="1" name=""/>
+        <p:cNvGrpSpPr/>
+        <p:nvPr/>
+      </p:nvGrpSpPr>
+      <p:grpSpPr>
+        <a:xfrm>
+          <a:off x="0" y="0"/>
+          <a:ext cx="0" cy="0"/>
+          <a:chOff x="0" y="0"/>
+          <a:chExt cx="0" cy="0"/>
+        </a:xfrm>
+      </p:grpSpPr>
+      <p:sp>
+        <p:nvSpPr>
           <p:cNvPr id="2" name="Title 1"/>
           <p:cNvSpPr>
             <a:spLocks noGrp="1"/>
@@ -18935,6 +19889,33 @@
 </file>
 
 <file path=customXml/item1.xml><?xml version="1.0" encoding="utf-8"?>
+<sax_ColorSelect>
+  <Line>
+    <Color val="D70012"/>
+    <Color val="EA6876"/>
+    <Color val="a80163"/>
+    <Color val="D067AD"/>
+    <Color val="3f136c"/>
+    <Color val="967CB1"/>
+    <Color val="08427e"/>
+    <Color val="6D9ABC"/>
+    <Color val="0e78c5"/>
+    <Color val="6FB9E2"/>
+    <Color val="1399a0"/>
+    <Color val="6FC9CC"/>
+    <Color val="67b419"/>
+    <Color val="AEDB7D"/>
+    <Color val="0a5139"/>
+    <Color val="6EA293"/>
+    <Color val="999FA6"/>
+    <Color val="D7D7D7"/>
+    <Color val="000000"/>
+    <Color val="FFFFFF"/>
+  </Line>
+</sax_ColorSelect>
+</file>
+
+<file path=customXml/item2.xml><?xml version="1.0" encoding="utf-8"?>
 <saxML>
   <saxMLTemplate>presentation_169</saxMLTemplate>
   <Variablen>
@@ -19083,41 +20064,14 @@
 </saxML>
 </file>
 
-<file path=customXml/item2.xml><?xml version="1.0" encoding="utf-8"?>
-<sax_ColorSelect>
-  <Line>
-    <Color val="D70012"/>
-    <Color val="EA6876"/>
-    <Color val="a80163"/>
-    <Color val="D067AD"/>
-    <Color val="3f136c"/>
-    <Color val="967CB1"/>
-    <Color val="08427e"/>
-    <Color val="6D9ABC"/>
-    <Color val="0e78c5"/>
-    <Color val="6FB9E2"/>
-    <Color val="1399a0"/>
-    <Color val="6FC9CC"/>
-    <Color val="67b419"/>
-    <Color val="AEDB7D"/>
-    <Color val="0a5139"/>
-    <Color val="6EA293"/>
-    <Color val="999FA6"/>
-    <Color val="D7D7D7"/>
-    <Color val="000000"/>
-    <Color val="FFFFFF"/>
-  </Line>
-</sax_ColorSelect>
-</file>
-
 <file path=customXml/itemProps1.xml><?xml version="1.0" encoding="utf-8"?>
-<ds:datastoreItem xmlns:ds="http://schemas.openxmlformats.org/officeDocument/2006/customXml" ds:itemID="{D0252559-44F8-474C-B66D-E357B88E32C2}">
+<ds:datastoreItem xmlns:ds="http://schemas.openxmlformats.org/officeDocument/2006/customXml" ds:itemID="{304CF217-3C90-4AA0-B541-CE45F9BD305E}">
   <ds:schemaRefs/>
 </ds:datastoreItem>
 </file>
 
 <file path=customXml/itemProps2.xml><?xml version="1.0" encoding="utf-8"?>
-<ds:datastoreItem xmlns:ds="http://schemas.openxmlformats.org/officeDocument/2006/customXml" ds:itemID="{304CF217-3C90-4AA0-B541-CE45F9BD305E}">
+<ds:datastoreItem xmlns:ds="http://schemas.openxmlformats.org/officeDocument/2006/customXml" ds:itemID="{D0252559-44F8-474C-B66D-E357B88E32C2}">
   <ds:schemaRefs/>
 </ds:datastoreItem>
 </file>
</xml_diff>